<commit_message>
a dozen or so student reported typos on piazza
</commit_message>
<xml_diff>
--- a/fall11/slidesF11/slides9m.pptx
+++ b/fall11/slidesF11/slides9m.pptx
@@ -19867,7 +19867,7 @@
         <p:spPr>
           <a:xfrm>
             <a:off x="884445" y="997802"/>
-            <a:ext cx="4725998" cy="769441"/>
+            <a:ext cx="5541250" cy="769441"/>
           </a:xfrm>
           <a:prstGeom prst="rect">
             <a:avLst/>
@@ -19884,7 +19884,13 @@
               <a:rPr lang="en-US" sz="4400" dirty="0" smtClean="0">
                 <a:latin typeface="+mj-lt"/>
               </a:rPr>
-              <a:t>color components</a:t>
+              <a:t>re-color </a:t>
+            </a:r>
+            <a:r>
+              <a:rPr lang="en-US" sz="4400" dirty="0" smtClean="0">
+                <a:latin typeface="+mj-lt"/>
+              </a:rPr>
+              <a:t>components</a:t>
             </a:r>
           </a:p>
         </p:txBody>

</xml_diff>